<commit_message>
[DI] Image distribution first version.
</commit_message>
<xml_diff>
--- a/DistributeImages/ImageArrayTest.pptx
+++ b/DistributeImages/ImageArrayTest.pptx
@@ -7,7 +7,6 @@
   <p:sldIdLst>
     <p:sldId id="256" r:id="rId2"/>
     <p:sldId id="257" r:id="rId3"/>
-    <p:sldId id="258" r:id="rId8"/>
   </p:sldIdLst>
   <p:sldSz cx="12192000" cy="6858000"/>
   <p:notesSz cx="6858000" cy="9144000"/>
@@ -300,7 +299,7 @@
           <a:p>
             <a:fld id="{18DF51ED-E207-4AA3-A601-940FB0D5645A}" type="datetimeFigureOut">
               <a:rPr lang="pl-PL" smtClean="0"/>
-              <a:t>05.11.2020</a:t>
+              <a:t>09.11.2020</a:t>
             </a:fld>
             <a:endParaRPr lang="pl-PL"/>
           </a:p>
@@ -575,7 +574,7 @@
           <a:p>
             <a:fld id="{18DF51ED-E207-4AA3-A601-940FB0D5645A}" type="datetimeFigureOut">
               <a:rPr lang="pl-PL" smtClean="0"/>
-              <a:t>05.11.2020</a:t>
+              <a:t>09.11.2020</a:t>
             </a:fld>
             <a:endParaRPr lang="pl-PL"/>
           </a:p>
@@ -769,7 +768,7 @@
           <a:p>
             <a:fld id="{18DF51ED-E207-4AA3-A601-940FB0D5645A}" type="datetimeFigureOut">
               <a:rPr lang="pl-PL" smtClean="0"/>
-              <a:t>05.11.2020</a:t>
+              <a:t>09.11.2020</a:t>
             </a:fld>
             <a:endParaRPr lang="pl-PL"/>
           </a:p>
@@ -1042,7 +1041,7 @@
           <a:p>
             <a:fld id="{18DF51ED-E207-4AA3-A601-940FB0D5645A}" type="datetimeFigureOut">
               <a:rPr lang="pl-PL" smtClean="0"/>
-              <a:t>05.11.2020</a:t>
+              <a:t>09.11.2020</a:t>
             </a:fld>
             <a:endParaRPr lang="pl-PL"/>
           </a:p>
@@ -1383,7 +1382,7 @@
           <a:p>
             <a:fld id="{18DF51ED-E207-4AA3-A601-940FB0D5645A}" type="datetimeFigureOut">
               <a:rPr lang="pl-PL" smtClean="0"/>
-              <a:t>05.11.2020</a:t>
+              <a:t>09.11.2020</a:t>
             </a:fld>
             <a:endParaRPr lang="pl-PL"/>
           </a:p>
@@ -2006,7 +2005,7 @@
           <a:p>
             <a:fld id="{18DF51ED-E207-4AA3-A601-940FB0D5645A}" type="datetimeFigureOut">
               <a:rPr lang="pl-PL" smtClean="0"/>
-              <a:t>05.11.2020</a:t>
+              <a:t>09.11.2020</a:t>
             </a:fld>
             <a:endParaRPr lang="pl-PL"/>
           </a:p>
@@ -2866,7 +2865,7 @@
           <a:p>
             <a:fld id="{18DF51ED-E207-4AA3-A601-940FB0D5645A}" type="datetimeFigureOut">
               <a:rPr lang="pl-PL" smtClean="0"/>
-              <a:t>05.11.2020</a:t>
+              <a:t>09.11.2020</a:t>
             </a:fld>
             <a:endParaRPr lang="pl-PL"/>
           </a:p>
@@ -3036,7 +3035,7 @@
           <a:p>
             <a:fld id="{18DF51ED-E207-4AA3-A601-940FB0D5645A}" type="datetimeFigureOut">
               <a:rPr lang="pl-PL" smtClean="0"/>
-              <a:t>05.11.2020</a:t>
+              <a:t>09.11.2020</a:t>
             </a:fld>
             <a:endParaRPr lang="pl-PL"/>
           </a:p>
@@ -3216,7 +3215,7 @@
           <a:p>
             <a:fld id="{18DF51ED-E207-4AA3-A601-940FB0D5645A}" type="datetimeFigureOut">
               <a:rPr lang="pl-PL" smtClean="0"/>
-              <a:t>05.11.2020</a:t>
+              <a:t>09.11.2020</a:t>
             </a:fld>
             <a:endParaRPr lang="pl-PL"/>
           </a:p>
@@ -3386,7 +3385,7 @@
           <a:p>
             <a:fld id="{18DF51ED-E207-4AA3-A601-940FB0D5645A}" type="datetimeFigureOut">
               <a:rPr lang="pl-PL" smtClean="0"/>
-              <a:t>05.11.2020</a:t>
+              <a:t>09.11.2020</a:t>
             </a:fld>
             <a:endParaRPr lang="pl-PL"/>
           </a:p>
@@ -3633,7 +3632,7 @@
           <a:p>
             <a:fld id="{18DF51ED-E207-4AA3-A601-940FB0D5645A}" type="datetimeFigureOut">
               <a:rPr lang="pl-PL" smtClean="0"/>
-              <a:t>05.11.2020</a:t>
+              <a:t>09.11.2020</a:t>
             </a:fld>
             <a:endParaRPr lang="pl-PL"/>
           </a:p>
@@ -3925,7 +3924,7 @@
           <a:p>
             <a:fld id="{18DF51ED-E207-4AA3-A601-940FB0D5645A}" type="datetimeFigureOut">
               <a:rPr lang="pl-PL" smtClean="0"/>
-              <a:t>05.11.2020</a:t>
+              <a:t>09.11.2020</a:t>
             </a:fld>
             <a:endParaRPr lang="pl-PL"/>
           </a:p>
@@ -4369,7 +4368,7 @@
           <a:p>
             <a:fld id="{18DF51ED-E207-4AA3-A601-940FB0D5645A}" type="datetimeFigureOut">
               <a:rPr lang="pl-PL" smtClean="0"/>
-              <a:t>05.11.2020</a:t>
+              <a:t>09.11.2020</a:t>
             </a:fld>
             <a:endParaRPr lang="pl-PL"/>
           </a:p>
@@ -4487,7 +4486,7 @@
           <a:p>
             <a:fld id="{18DF51ED-E207-4AA3-A601-940FB0D5645A}" type="datetimeFigureOut">
               <a:rPr lang="pl-PL" smtClean="0"/>
-              <a:t>05.11.2020</a:t>
+              <a:t>09.11.2020</a:t>
             </a:fld>
             <a:endParaRPr lang="pl-PL"/>
           </a:p>
@@ -4582,7 +4581,7 @@
           <a:p>
             <a:fld id="{18DF51ED-E207-4AA3-A601-940FB0D5645A}" type="datetimeFigureOut">
               <a:rPr lang="pl-PL" smtClean="0"/>
-              <a:t>05.11.2020</a:t>
+              <a:t>09.11.2020</a:t>
             </a:fld>
             <a:endParaRPr lang="pl-PL"/>
           </a:p>
@@ -4861,7 +4860,7 @@
           <a:p>
             <a:fld id="{18DF51ED-E207-4AA3-A601-940FB0D5645A}" type="datetimeFigureOut">
               <a:rPr lang="pl-PL" smtClean="0"/>
-              <a:t>05.11.2020</a:t>
+              <a:t>09.11.2020</a:t>
             </a:fld>
             <a:endParaRPr lang="pl-PL"/>
           </a:p>
@@ -5136,7 +5135,7 @@
           <a:p>
             <a:fld id="{18DF51ED-E207-4AA3-A601-940FB0D5645A}" type="datetimeFigureOut">
               <a:rPr lang="pl-PL" smtClean="0"/>
-              <a:t>05.11.2020</a:t>
+              <a:t>09.11.2020</a:t>
             </a:fld>
             <a:endParaRPr lang="pl-PL"/>
           </a:p>
@@ -5565,7 +5564,7 @@
           <a:p>
             <a:fld id="{18DF51ED-E207-4AA3-A601-940FB0D5645A}" type="datetimeFigureOut">
               <a:rPr lang="pl-PL" smtClean="0"/>
-              <a:t>05.11.2020</a:t>
+              <a:t>09.11.2020</a:t>
             </a:fld>
             <a:endParaRPr lang="pl-PL"/>
           </a:p>
@@ -7131,6 +7130,19 @@
 <file path=ppt/slides/slide2.xml><?xml version="1.0" encoding="utf-8"?>
 <p:sld xmlns:a="http://schemas.openxmlformats.org/drawingml/2006/main" xmlns:r="http://schemas.openxmlformats.org/officeDocument/2006/relationships" xmlns:p="http://schemas.openxmlformats.org/presentationml/2006/main">
   <p:cSld>
+    <p:bg>
+      <p:bgPr>
+        <a:pattFill prst="diagBrick">
+          <a:fgClr>
+            <a:schemeClr val="accent1"/>
+          </a:fgClr>
+          <a:bgClr>
+            <a:schemeClr val="bg1"/>
+          </a:bgClr>
+        </a:pattFill>
+        <a:effectLst/>
+      </p:bgPr>
+    </p:bg>
     <p:spTree>
       <p:nvGrpSpPr>
         <p:cNvPr id="1" name=""/>
@@ -7333,66 +7345,6 @@
         <p14:creationId xmlns:p14="http://schemas.microsoft.com/office/powerpoint/2010/main" val="1306858078"/>
       </p:ext>
     </p:extLst>
-  </p:cSld>
-  <p:clrMapOvr>
-    <a:masterClrMapping/>
-  </p:clrMapOvr>
-</p:sld>
-</file>
-
-<file path=ppt/slides/slide3.xml><?xml version="1.0" encoding="utf-8"?>
-<p:sld xmlns:a="http://schemas.openxmlformats.org/drawingml/2006/main" xmlns:p="http://schemas.openxmlformats.org/presentationml/2006/main" xmlns:r="http://schemas.openxmlformats.org/officeDocument/2006/relationships">
-  <p:cSld>
-    <p:spTree>
-      <p:nvGrpSpPr>
-        <p:cNvPr id="1" name=""/>
-        <p:cNvGrpSpPr/>
-        <p:nvPr/>
-      </p:nvGrpSpPr>
-      <p:grpSpPr/>
-      <p:sp>
-        <p:nvSpPr>
-          <p:cNvPr id="2" name="Title 1"/>
-          <p:cNvSpPr>
-            <a:spLocks noGrp="1"/>
-          </p:cNvSpPr>
-          <p:nvPr>
-            <p:ph type="ctrTitle"/>
-          </p:nvPr>
-        </p:nvSpPr>
-        <p:spPr/>
-        <p:txBody>
-          <a:bodyPr/>
-          <a:lstStyle/>
-          <a:p>
-            <a:r>
-              <a:t>Hello, World!</a:t>
-            </a:r>
-          </a:p>
-        </p:txBody>
-      </p:sp>
-      <p:sp>
-        <p:nvSpPr>
-          <p:cNvPr id="3" name="Subtitle 2"/>
-          <p:cNvSpPr>
-            <a:spLocks noGrp="1"/>
-          </p:cNvSpPr>
-          <p:nvPr>
-            <p:ph type="subTitle" idx="1"/>
-          </p:nvPr>
-        </p:nvSpPr>
-        <p:spPr/>
-        <p:txBody>
-          <a:bodyPr/>
-          <a:lstStyle/>
-          <a:p>
-            <a:r>
-              <a:t>python-pptx was here!</a:t>
-            </a:r>
-          </a:p>
-        </p:txBody>
-      </p:sp>
-    </p:spTree>
   </p:cSld>
   <p:clrMapOvr>
     <a:masterClrMapping/>

</xml_diff>